<commit_message>
changed base images and gen_py function and added inference images for societe and weather domains
</commit_message>
<xml_diff>
--- a/experiment/materials/images/society/society.pptx
+++ b/experiment/materials/images/society/society.pptx
@@ -7,21 +7,7 @@
   <p:sldIdLst>
     <p:sldId id="263" r:id="rId2"/>
     <p:sldId id="282" r:id="rId3"/>
-    <p:sldId id="266" r:id="rId4"/>
-    <p:sldId id="296" r:id="rId5"/>
-    <p:sldId id="297" r:id="rId6"/>
-    <p:sldId id="288" r:id="rId7"/>
-    <p:sldId id="289" r:id="rId8"/>
-    <p:sldId id="267" r:id="rId9"/>
-    <p:sldId id="298" r:id="rId10"/>
-    <p:sldId id="299" r:id="rId11"/>
-    <p:sldId id="277" r:id="rId12"/>
-    <p:sldId id="278" r:id="rId13"/>
-    <p:sldId id="285" r:id="rId14"/>
-    <p:sldId id="300" r:id="rId15"/>
-    <p:sldId id="301" r:id="rId16"/>
-    <p:sldId id="280" r:id="rId17"/>
-    <p:sldId id="281" r:id="rId18"/>
+    <p:sldId id="289" r:id="rId4"/>
   </p:sldIdLst>
   <p:sldSz cx="6665913" cy="987425"/>
   <p:notesSz cx="6858000" cy="9144000"/>
@@ -259,7 +245,7 @@
           <a:p>
             <a:fld id="{DA0EE935-E9AF-7B48-BD90-8AB4BA8C33E5}" type="datetimeFigureOut">
               <a:rPr lang="en-US" smtClean="0"/>
-              <a:t>1/8/21</a:t>
+              <a:t>09-Jan-21</a:t>
             </a:fld>
             <a:endParaRPr lang="en-US"/>
           </a:p>
@@ -429,7 +415,7 @@
           <a:p>
             <a:fld id="{DA0EE935-E9AF-7B48-BD90-8AB4BA8C33E5}" type="datetimeFigureOut">
               <a:rPr lang="en-US" smtClean="0"/>
-              <a:t>1/8/21</a:t>
+              <a:t>09-Jan-21</a:t>
             </a:fld>
             <a:endParaRPr lang="en-US"/>
           </a:p>
@@ -609,7 +595,7 @@
           <a:p>
             <a:fld id="{DA0EE935-E9AF-7B48-BD90-8AB4BA8C33E5}" type="datetimeFigureOut">
               <a:rPr lang="en-US" smtClean="0"/>
-              <a:t>1/8/21</a:t>
+              <a:t>09-Jan-21</a:t>
             </a:fld>
             <a:endParaRPr lang="en-US"/>
           </a:p>
@@ -779,7 +765,7 @@
           <a:p>
             <a:fld id="{DA0EE935-E9AF-7B48-BD90-8AB4BA8C33E5}" type="datetimeFigureOut">
               <a:rPr lang="en-US" smtClean="0"/>
-              <a:t>1/8/21</a:t>
+              <a:t>09-Jan-21</a:t>
             </a:fld>
             <a:endParaRPr lang="en-US"/>
           </a:p>
@@ -1025,7 +1011,7 @@
           <a:p>
             <a:fld id="{DA0EE935-E9AF-7B48-BD90-8AB4BA8C33E5}" type="datetimeFigureOut">
               <a:rPr lang="en-US" smtClean="0"/>
-              <a:t>1/8/21</a:t>
+              <a:t>09-Jan-21</a:t>
             </a:fld>
             <a:endParaRPr lang="en-US"/>
           </a:p>
@@ -1257,7 +1243,7 @@
           <a:p>
             <a:fld id="{DA0EE935-E9AF-7B48-BD90-8AB4BA8C33E5}" type="datetimeFigureOut">
               <a:rPr lang="en-US" smtClean="0"/>
-              <a:t>1/8/21</a:t>
+              <a:t>09-Jan-21</a:t>
             </a:fld>
             <a:endParaRPr lang="en-US"/>
           </a:p>
@@ -1624,7 +1610,7 @@
           <a:p>
             <a:fld id="{DA0EE935-E9AF-7B48-BD90-8AB4BA8C33E5}" type="datetimeFigureOut">
               <a:rPr lang="en-US" smtClean="0"/>
-              <a:t>1/8/21</a:t>
+              <a:t>09-Jan-21</a:t>
             </a:fld>
             <a:endParaRPr lang="en-US"/>
           </a:p>
@@ -1742,7 +1728,7 @@
           <a:p>
             <a:fld id="{DA0EE935-E9AF-7B48-BD90-8AB4BA8C33E5}" type="datetimeFigureOut">
               <a:rPr lang="en-US" smtClean="0"/>
-              <a:t>1/8/21</a:t>
+              <a:t>09-Jan-21</a:t>
             </a:fld>
             <a:endParaRPr lang="en-US"/>
           </a:p>
@@ -1837,7 +1823,7 @@
           <a:p>
             <a:fld id="{DA0EE935-E9AF-7B48-BD90-8AB4BA8C33E5}" type="datetimeFigureOut">
               <a:rPr lang="en-US" smtClean="0"/>
-              <a:t>1/8/21</a:t>
+              <a:t>09-Jan-21</a:t>
             </a:fld>
             <a:endParaRPr lang="en-US"/>
           </a:p>
@@ -2114,7 +2100,7 @@
           <a:p>
             <a:fld id="{DA0EE935-E9AF-7B48-BD90-8AB4BA8C33E5}" type="datetimeFigureOut">
               <a:rPr lang="en-US" smtClean="0"/>
-              <a:t>1/8/21</a:t>
+              <a:t>09-Jan-21</a:t>
             </a:fld>
             <a:endParaRPr lang="en-US"/>
           </a:p>
@@ -2371,7 +2357,7 @@
           <a:p>
             <a:fld id="{DA0EE935-E9AF-7B48-BD90-8AB4BA8C33E5}" type="datetimeFigureOut">
               <a:rPr lang="en-US" smtClean="0"/>
-              <a:t>1/8/21</a:t>
+              <a:t>09-Jan-21</a:t>
             </a:fld>
             <a:endParaRPr lang="en-US"/>
           </a:p>
@@ -2584,7 +2570,7 @@
           <a:p>
             <a:fld id="{DA0EE935-E9AF-7B48-BD90-8AB4BA8C33E5}" type="datetimeFigureOut">
               <a:rPr lang="en-US" smtClean="0"/>
-              <a:t>1/8/21</a:t>
+              <a:t>09-Jan-21</a:t>
             </a:fld>
             <a:endParaRPr lang="en-US"/>
           </a:p>
@@ -3053,7 +3039,7 @@
                 <a:ea typeface="Helvetica Neue Medium" panose="02000503000000020004" pitchFamily="2" charset="0"/>
                 <a:cs typeface="Helvetica Neue Medium" panose="02000503000000020004" pitchFamily="2" charset="0"/>
               </a:rPr>
-              <a:t>Urbanization</a:t>
+              <a:t>Humidity</a:t>
             </a:r>
           </a:p>
         </p:txBody>
@@ -3072,8 +3058,8 @@
         </p:nvSpPr>
         <p:spPr>
           <a:xfrm>
-            <a:off x="-1924" y="248513"/>
-            <a:ext cx="2560932" cy="490398"/>
+            <a:off x="-1924" y="299243"/>
+            <a:ext cx="2560932" cy="389938"/>
           </a:xfrm>
           <a:prstGeom prst="roundRect">
             <a:avLst/>
@@ -3114,7 +3100,7 @@
           <a:p>
             <a:pPr algn="ctr"/>
             <a:r>
-              <a:rPr lang="en-US" sz="1400" b="1" dirty="0">
+              <a:rPr lang="en-US" sz="1800" b="1" dirty="0">
                 <a:solidFill>
                   <a:schemeClr val="tx1"/>
                 </a:solidFill>
@@ -3122,21 +3108,7 @@
                 <a:ea typeface="Helvetica Neue Medium" panose="02000503000000020004" pitchFamily="2" charset="0"/>
                 <a:cs typeface="Helvetica Neue Medium" panose="02000503000000020004" pitchFamily="2" charset="0"/>
               </a:rPr>
-              <a:t>Socio-economic </a:t>
-            </a:r>
-          </a:p>
-          <a:p>
-            <a:pPr algn="ctr"/>
-            <a:r>
-              <a:rPr lang="en-US" sz="1400" b="1" dirty="0">
-                <a:solidFill>
-                  <a:schemeClr val="tx1"/>
-                </a:solidFill>
-                <a:latin typeface="Helvetica" pitchFamily="2" charset="0"/>
-                <a:ea typeface="Helvetica Neue Medium" panose="02000503000000020004" pitchFamily="2" charset="0"/>
-                <a:cs typeface="Helvetica Neue Medium" panose="02000503000000020004" pitchFamily="2" charset="0"/>
-              </a:rPr>
-              <a:t>mobility</a:t>
+              <a:t>Air pressure</a:t>
             </a:r>
           </a:p>
         </p:txBody>
@@ -3159,8 +3131,8 @@
         </p:nvCxnSpPr>
         <p:spPr>
           <a:xfrm flipV="1">
-            <a:off x="2559008" y="187095"/>
-            <a:ext cx="900714" cy="306617"/>
+            <a:off x="2559009" y="187095"/>
+            <a:ext cx="900713" cy="307117"/>
           </a:xfrm>
           <a:prstGeom prst="straightConnector1">
             <a:avLst/>
@@ -3208,8 +3180,8 @@
         </p:nvCxnSpPr>
         <p:spPr>
           <a:xfrm>
-            <a:off x="2559008" y="493712"/>
-            <a:ext cx="900713" cy="307617"/>
+            <a:off x="2559008" y="494212"/>
+            <a:ext cx="900712" cy="307117"/>
           </a:xfrm>
           <a:prstGeom prst="straightConnector1">
             <a:avLst/>
@@ -3342,7 +3314,7 @@
                 <a:ea typeface="Helvetica Neue Medium" panose="02000503000000020004" pitchFamily="2" charset="0"/>
                 <a:cs typeface="Helvetica Neue Medium" panose="02000503000000020004" pitchFamily="2" charset="0"/>
               </a:rPr>
-              <a:t>Interest in religion</a:t>
+              <a:t>Ozone</a:t>
             </a:r>
           </a:p>
         </p:txBody>
@@ -3390,859 +3362,6 @@
     <p:extLst>
       <p:ext uri="{BB962C8B-B14F-4D97-AF65-F5344CB8AC3E}">
         <p14:creationId xmlns:p14="http://schemas.microsoft.com/office/powerpoint/2010/main" val="3437680589"/>
-      </p:ext>
-    </p:extLst>
-  </p:cSld>
-  <p:clrMapOvr>
-    <a:masterClrMapping/>
-  </p:clrMapOvr>
-</p:sld>
-</file>
-
-<file path=ppt/slides/slide10.xml><?xml version="1.0" encoding="utf-8"?>
-<p:sld xmlns:a="http://schemas.openxmlformats.org/drawingml/2006/main" xmlns:r="http://schemas.openxmlformats.org/officeDocument/2006/relationships" xmlns:p="http://schemas.openxmlformats.org/presentationml/2006/main">
-  <p:cSld>
-    <p:spTree>
-      <p:nvGrpSpPr>
-        <p:cNvPr id="1" name=""/>
-        <p:cNvGrpSpPr/>
-        <p:nvPr/>
-      </p:nvGrpSpPr>
-      <p:grpSpPr>
-        <a:xfrm>
-          <a:off x="0" y="0"/>
-          <a:ext cx="0" cy="0"/>
-          <a:chOff x="0" y="0"/>
-          <a:chExt cx="0" cy="0"/>
-        </a:xfrm>
-      </p:grpSpPr>
-      <p:sp>
-        <p:nvSpPr>
-          <p:cNvPr id="4" name="Rounded Rectangle 3">
-            <a:extLst>
-              <a:ext uri="{FF2B5EF4-FFF2-40B4-BE49-F238E27FC236}">
-                <a16:creationId xmlns:a16="http://schemas.microsoft.com/office/drawing/2014/main" id="{53429979-B7B1-6A4F-8FBF-1395B30A54CD}"/>
-              </a:ext>
-            </a:extLst>
-          </p:cNvPr>
-          <p:cNvSpPr/>
-          <p:nvPr/>
-        </p:nvSpPr>
-        <p:spPr>
-          <a:xfrm>
-            <a:off x="3459722" y="0"/>
-            <a:ext cx="3206191" cy="374190"/>
-          </a:xfrm>
-          <a:prstGeom prst="roundRect">
-            <a:avLst/>
-          </a:prstGeom>
-          <a:solidFill>
-            <a:schemeClr val="bg1">
-              <a:lumMod val="85000"/>
-            </a:schemeClr>
-          </a:solidFill>
-          <a:ln>
-            <a:noFill/>
-          </a:ln>
-        </p:spPr>
-        <p:style>
-          <a:lnRef idx="2">
-            <a:schemeClr val="accent1">
-              <a:shade val="50000"/>
-            </a:schemeClr>
-          </a:lnRef>
-          <a:fillRef idx="1">
-            <a:schemeClr val="accent1"/>
-          </a:fillRef>
-          <a:effectRef idx="0">
-            <a:schemeClr val="accent1"/>
-          </a:effectRef>
-          <a:fontRef idx="minor">
-            <a:schemeClr val="lt1"/>
-          </a:fontRef>
-        </p:style>
-        <p:txBody>
-          <a:bodyPr rot="0" spcFirstLastPara="0" vertOverflow="overflow" horzOverflow="overflow" vert="horz" wrap="square" lIns="91440" tIns="45720" rIns="91440" bIns="45720" numCol="1" spcCol="0" rtlCol="0" fromWordArt="0" anchor="ctr" anchorCtr="0" forceAA="0" compatLnSpc="1">
-            <a:prstTxWarp prst="textNoShape">
-              <a:avLst/>
-            </a:prstTxWarp>
-            <a:noAutofit/>
-          </a:bodyPr>
-          <a:lstStyle/>
-          <a:p>
-            <a:pPr algn="ctr"/>
-            <a:r>
-              <a:rPr lang="en-US" sz="1600" b="1" dirty="0">
-                <a:solidFill>
-                  <a:schemeClr val="tx1"/>
-                </a:solidFill>
-                <a:latin typeface="Helvetica" pitchFamily="2" charset="0"/>
-                <a:ea typeface="Helvetica Neue Medium" panose="02000503000000020004" pitchFamily="2" charset="0"/>
-                <a:cs typeface="Helvetica Neue Medium" panose="02000503000000020004" pitchFamily="2" charset="0"/>
-              </a:rPr>
-              <a:t>Normal degree of urbanization</a:t>
-            </a:r>
-          </a:p>
-        </p:txBody>
-      </p:sp>
-    </p:spTree>
-    <p:extLst>
-      <p:ext uri="{BB962C8B-B14F-4D97-AF65-F5344CB8AC3E}">
-        <p14:creationId xmlns:p14="http://schemas.microsoft.com/office/powerpoint/2010/main" val="1108016751"/>
-      </p:ext>
-    </p:extLst>
-  </p:cSld>
-  <p:clrMapOvr>
-    <a:masterClrMapping/>
-  </p:clrMapOvr>
-</p:sld>
-</file>
-
-<file path=ppt/slides/slide11.xml><?xml version="1.0" encoding="utf-8"?>
-<p:sld xmlns:a="http://schemas.openxmlformats.org/drawingml/2006/main" xmlns:r="http://schemas.openxmlformats.org/officeDocument/2006/relationships" xmlns:p="http://schemas.openxmlformats.org/presentationml/2006/main">
-  <p:cSld>
-    <p:spTree>
-      <p:nvGrpSpPr>
-        <p:cNvPr id="1" name=""/>
-        <p:cNvGrpSpPr/>
-        <p:nvPr/>
-      </p:nvGrpSpPr>
-      <p:grpSpPr>
-        <a:xfrm>
-          <a:off x="0" y="0"/>
-          <a:ext cx="0" cy="0"/>
-          <a:chOff x="0" y="0"/>
-          <a:chExt cx="0" cy="0"/>
-        </a:xfrm>
-      </p:grpSpPr>
-      <p:sp>
-        <p:nvSpPr>
-          <p:cNvPr id="6" name="Rounded Rectangle 5">
-            <a:extLst>
-              <a:ext uri="{FF2B5EF4-FFF2-40B4-BE49-F238E27FC236}">
-                <a16:creationId xmlns:a16="http://schemas.microsoft.com/office/drawing/2014/main" id="{8AA4C072-4BF5-9548-9AF0-23891D0D46B7}"/>
-              </a:ext>
-            </a:extLst>
-          </p:cNvPr>
-          <p:cNvSpPr/>
-          <p:nvPr/>
-        </p:nvSpPr>
-        <p:spPr>
-          <a:xfrm>
-            <a:off x="3459722" y="0"/>
-            <a:ext cx="3206191" cy="374190"/>
-          </a:xfrm>
-          <a:prstGeom prst="roundRect">
-            <a:avLst/>
-          </a:prstGeom>
-          <a:solidFill>
-            <a:schemeClr val="bg1">
-              <a:lumMod val="85000"/>
-            </a:schemeClr>
-          </a:solidFill>
-          <a:ln>
-            <a:noFill/>
-          </a:ln>
-        </p:spPr>
-        <p:style>
-          <a:lnRef idx="2">
-            <a:schemeClr val="accent1">
-              <a:shade val="50000"/>
-            </a:schemeClr>
-          </a:lnRef>
-          <a:fillRef idx="1">
-            <a:schemeClr val="accent1"/>
-          </a:fillRef>
-          <a:effectRef idx="0">
-            <a:schemeClr val="accent1"/>
-          </a:effectRef>
-          <a:fontRef idx="minor">
-            <a:schemeClr val="lt1"/>
-          </a:fontRef>
-        </p:style>
-        <p:txBody>
-          <a:bodyPr rot="0" spcFirstLastPara="0" vertOverflow="overflow" horzOverflow="overflow" vert="horz" wrap="square" lIns="91440" tIns="45720" rIns="91440" bIns="45720" numCol="1" spcCol="0" rtlCol="0" fromWordArt="0" anchor="ctr" anchorCtr="0" forceAA="0" compatLnSpc="1">
-            <a:prstTxWarp prst="textNoShape">
-              <a:avLst/>
-            </a:prstTxWarp>
-            <a:noAutofit/>
-          </a:bodyPr>
-          <a:lstStyle/>
-          <a:p>
-            <a:pPr algn="ctr"/>
-            <a:r>
-              <a:rPr lang="en-US" sz="1800" b="1" dirty="0">
-                <a:solidFill>
-                  <a:schemeClr val="tx1"/>
-                </a:solidFill>
-                <a:latin typeface="Helvetica" pitchFamily="2" charset="0"/>
-                <a:ea typeface="Helvetica Neue Medium" panose="02000503000000020004" pitchFamily="2" charset="0"/>
-                <a:cs typeface="Helvetica Neue Medium" panose="02000503000000020004" pitchFamily="2" charset="0"/>
-              </a:rPr>
-              <a:t>???</a:t>
-            </a:r>
-          </a:p>
-        </p:txBody>
-      </p:sp>
-    </p:spTree>
-    <p:extLst>
-      <p:ext uri="{BB962C8B-B14F-4D97-AF65-F5344CB8AC3E}">
-        <p14:creationId xmlns:p14="http://schemas.microsoft.com/office/powerpoint/2010/main" val="3807020776"/>
-      </p:ext>
-    </p:extLst>
-  </p:cSld>
-  <p:clrMapOvr>
-    <a:masterClrMapping/>
-  </p:clrMapOvr>
-</p:sld>
-</file>
-
-<file path=ppt/slides/slide12.xml><?xml version="1.0" encoding="utf-8"?>
-<p:sld xmlns:a="http://schemas.openxmlformats.org/drawingml/2006/main" xmlns:r="http://schemas.openxmlformats.org/officeDocument/2006/relationships" xmlns:p="http://schemas.openxmlformats.org/presentationml/2006/main">
-  <p:cSld>
-    <p:spTree>
-      <p:nvGrpSpPr>
-        <p:cNvPr id="1" name=""/>
-        <p:cNvGrpSpPr/>
-        <p:nvPr/>
-      </p:nvGrpSpPr>
-      <p:grpSpPr>
-        <a:xfrm>
-          <a:off x="0" y="0"/>
-          <a:ext cx="0" cy="0"/>
-          <a:chOff x="0" y="0"/>
-          <a:chExt cx="0" cy="0"/>
-        </a:xfrm>
-      </p:grpSpPr>
-      <p:sp>
-        <p:nvSpPr>
-          <p:cNvPr id="6" name="Rounded Rectangle 5">
-            <a:extLst>
-              <a:ext uri="{FF2B5EF4-FFF2-40B4-BE49-F238E27FC236}">
-                <a16:creationId xmlns:a16="http://schemas.microsoft.com/office/drawing/2014/main" id="{8AA4C072-4BF5-9548-9AF0-23891D0D46B7}"/>
-              </a:ext>
-            </a:extLst>
-          </p:cNvPr>
-          <p:cNvSpPr/>
-          <p:nvPr/>
-        </p:nvSpPr>
-        <p:spPr>
-          <a:xfrm>
-            <a:off x="3459722" y="0"/>
-            <a:ext cx="3206191" cy="374190"/>
-          </a:xfrm>
-          <a:prstGeom prst="roundRect">
-            <a:avLst/>
-          </a:prstGeom>
-          <a:solidFill>
-            <a:schemeClr val="bg1">
-              <a:lumMod val="85000"/>
-            </a:schemeClr>
-          </a:solidFill>
-          <a:ln>
-            <a:noFill/>
-          </a:ln>
-        </p:spPr>
-        <p:style>
-          <a:lnRef idx="2">
-            <a:schemeClr val="accent1">
-              <a:shade val="50000"/>
-            </a:schemeClr>
-          </a:lnRef>
-          <a:fillRef idx="1">
-            <a:schemeClr val="accent1"/>
-          </a:fillRef>
-          <a:effectRef idx="0">
-            <a:schemeClr val="accent1"/>
-          </a:effectRef>
-          <a:fontRef idx="minor">
-            <a:schemeClr val="lt1"/>
-          </a:fontRef>
-        </p:style>
-        <p:txBody>
-          <a:bodyPr rot="0" spcFirstLastPara="0" vertOverflow="overflow" horzOverflow="overflow" vert="horz" wrap="square" lIns="91440" tIns="45720" rIns="91440" bIns="45720" numCol="1" spcCol="0" rtlCol="0" fromWordArt="0" anchor="ctr" anchorCtr="0" forceAA="0" compatLnSpc="1">
-            <a:prstTxWarp prst="textNoShape">
-              <a:avLst/>
-            </a:prstTxWarp>
-            <a:noAutofit/>
-          </a:bodyPr>
-          <a:lstStyle/>
-          <a:p>
-            <a:pPr algn="ctr"/>
-            <a:r>
-              <a:rPr lang="en-US" sz="1800" b="1" dirty="0">
-                <a:solidFill>
-                  <a:schemeClr val="tx1"/>
-                </a:solidFill>
-                <a:latin typeface="Helvetica" pitchFamily="2" charset="0"/>
-                <a:ea typeface="Helvetica Neue Medium" panose="02000503000000020004" pitchFamily="2" charset="0"/>
-                <a:cs typeface="Helvetica Neue Medium" panose="02000503000000020004" pitchFamily="2" charset="0"/>
-              </a:rPr>
-              <a:t>_____</a:t>
-            </a:r>
-          </a:p>
-        </p:txBody>
-      </p:sp>
-    </p:spTree>
-    <p:extLst>
-      <p:ext uri="{BB962C8B-B14F-4D97-AF65-F5344CB8AC3E}">
-        <p14:creationId xmlns:p14="http://schemas.microsoft.com/office/powerpoint/2010/main" val="2615475280"/>
-      </p:ext>
-    </p:extLst>
-  </p:cSld>
-  <p:clrMapOvr>
-    <a:masterClrMapping/>
-  </p:clrMapOvr>
-</p:sld>
-</file>
-
-<file path=ppt/slides/slide13.xml><?xml version="1.0" encoding="utf-8"?>
-<p:sld xmlns:a="http://schemas.openxmlformats.org/drawingml/2006/main" xmlns:r="http://schemas.openxmlformats.org/officeDocument/2006/relationships" xmlns:p="http://schemas.openxmlformats.org/presentationml/2006/main">
-  <p:cSld>
-    <p:bg>
-      <p:bgPr>
-        <a:solidFill>
-          <a:schemeClr val="bg1">
-            <a:alpha val="0"/>
-          </a:schemeClr>
-        </a:solidFill>
-        <a:effectLst/>
-      </p:bgPr>
-    </p:bg>
-    <p:spTree>
-      <p:nvGrpSpPr>
-        <p:cNvPr id="1" name=""/>
-        <p:cNvGrpSpPr/>
-        <p:nvPr/>
-      </p:nvGrpSpPr>
-      <p:grpSpPr>
-        <a:xfrm>
-          <a:off x="0" y="0"/>
-          <a:ext cx="0" cy="0"/>
-          <a:chOff x="0" y="0"/>
-          <a:chExt cx="0" cy="0"/>
-        </a:xfrm>
-      </p:grpSpPr>
-      <p:sp>
-        <p:nvSpPr>
-          <p:cNvPr id="4" name="Rounded Rectangle 3">
-            <a:extLst>
-              <a:ext uri="{FF2B5EF4-FFF2-40B4-BE49-F238E27FC236}">
-                <a16:creationId xmlns:a16="http://schemas.microsoft.com/office/drawing/2014/main" id="{4017A166-4188-F842-9BBD-BD585C819181}"/>
-              </a:ext>
-            </a:extLst>
-          </p:cNvPr>
-          <p:cNvSpPr/>
-          <p:nvPr/>
-        </p:nvSpPr>
-        <p:spPr>
-          <a:xfrm>
-            <a:off x="3459721" y="614234"/>
-            <a:ext cx="3206191" cy="374190"/>
-          </a:xfrm>
-          <a:prstGeom prst="roundRect">
-            <a:avLst/>
-          </a:prstGeom>
-          <a:solidFill>
-            <a:schemeClr val="bg1">
-              <a:lumMod val="85000"/>
-            </a:schemeClr>
-          </a:solidFill>
-          <a:ln>
-            <a:noFill/>
-          </a:ln>
-        </p:spPr>
-        <p:style>
-          <a:lnRef idx="2">
-            <a:schemeClr val="accent1">
-              <a:shade val="50000"/>
-            </a:schemeClr>
-          </a:lnRef>
-          <a:fillRef idx="1">
-            <a:schemeClr val="accent1"/>
-          </a:fillRef>
-          <a:effectRef idx="0">
-            <a:schemeClr val="accent1"/>
-          </a:effectRef>
-          <a:fontRef idx="minor">
-            <a:schemeClr val="lt1"/>
-          </a:fontRef>
-        </p:style>
-        <p:txBody>
-          <a:bodyPr rot="0" spcFirstLastPara="0" vertOverflow="overflow" horzOverflow="overflow" vert="horz" wrap="square" lIns="91440" tIns="45720" rIns="91440" bIns="45720" numCol="1" spcCol="0" rtlCol="0" fromWordArt="0" anchor="ctr" anchorCtr="0" forceAA="0" compatLnSpc="1">
-            <a:prstTxWarp prst="textNoShape">
-              <a:avLst/>
-            </a:prstTxWarp>
-            <a:noAutofit/>
-          </a:bodyPr>
-          <a:lstStyle/>
-          <a:p>
-            <a:pPr algn="ctr"/>
-            <a:r>
-              <a:rPr lang="en-US" sz="1800" b="1">
-                <a:solidFill>
-                  <a:schemeClr val="tx1"/>
-                </a:solidFill>
-                <a:latin typeface="Helvetica" pitchFamily="2" charset="0"/>
-                <a:ea typeface="Helvetica Neue Medium" panose="02000503000000020004" pitchFamily="2" charset="0"/>
-                <a:cs typeface="Helvetica Neue Medium" panose="02000503000000020004" pitchFamily="2" charset="0"/>
-              </a:rPr>
-              <a:t>High </a:t>
-            </a:r>
-            <a:r>
-              <a:rPr lang="en-US" sz="1800" b="1" dirty="0">
-                <a:solidFill>
-                  <a:schemeClr val="tx1"/>
-                </a:solidFill>
-                <a:latin typeface="Helvetica" pitchFamily="2" charset="0"/>
-                <a:ea typeface="Helvetica Neue Medium" panose="02000503000000020004" pitchFamily="2" charset="0"/>
-                <a:cs typeface="Helvetica Neue Medium" panose="02000503000000020004" pitchFamily="2" charset="0"/>
-              </a:rPr>
-              <a:t>interest in religion</a:t>
-            </a:r>
-          </a:p>
-        </p:txBody>
-      </p:sp>
-    </p:spTree>
-    <p:extLst>
-      <p:ext uri="{BB962C8B-B14F-4D97-AF65-F5344CB8AC3E}">
-        <p14:creationId xmlns:p14="http://schemas.microsoft.com/office/powerpoint/2010/main" val="845474794"/>
-      </p:ext>
-    </p:extLst>
-  </p:cSld>
-  <p:clrMapOvr>
-    <a:masterClrMapping/>
-  </p:clrMapOvr>
-</p:sld>
-</file>
-
-<file path=ppt/slides/slide14.xml><?xml version="1.0" encoding="utf-8"?>
-<p:sld xmlns:a="http://schemas.openxmlformats.org/drawingml/2006/main" xmlns:r="http://schemas.openxmlformats.org/officeDocument/2006/relationships" xmlns:p="http://schemas.openxmlformats.org/presentationml/2006/main">
-  <p:cSld>
-    <p:bg>
-      <p:bgPr>
-        <a:solidFill>
-          <a:schemeClr val="bg1">
-            <a:alpha val="0"/>
-          </a:schemeClr>
-        </a:solidFill>
-        <a:effectLst/>
-      </p:bgPr>
-    </p:bg>
-    <p:spTree>
-      <p:nvGrpSpPr>
-        <p:cNvPr id="1" name=""/>
-        <p:cNvGrpSpPr/>
-        <p:nvPr/>
-      </p:nvGrpSpPr>
-      <p:grpSpPr>
-        <a:xfrm>
-          <a:off x="0" y="0"/>
-          <a:ext cx="0" cy="0"/>
-          <a:chOff x="0" y="0"/>
-          <a:chExt cx="0" cy="0"/>
-        </a:xfrm>
-      </p:grpSpPr>
-      <p:sp>
-        <p:nvSpPr>
-          <p:cNvPr id="4" name="Rounded Rectangle 3">
-            <a:extLst>
-              <a:ext uri="{FF2B5EF4-FFF2-40B4-BE49-F238E27FC236}">
-                <a16:creationId xmlns:a16="http://schemas.microsoft.com/office/drawing/2014/main" id="{4017A166-4188-F842-9BBD-BD585C819181}"/>
-              </a:ext>
-            </a:extLst>
-          </p:cNvPr>
-          <p:cNvSpPr/>
-          <p:nvPr/>
-        </p:nvSpPr>
-        <p:spPr>
-          <a:xfrm>
-            <a:off x="3459721" y="614234"/>
-            <a:ext cx="3206191" cy="374190"/>
-          </a:xfrm>
-          <a:prstGeom prst="roundRect">
-            <a:avLst/>
-          </a:prstGeom>
-          <a:solidFill>
-            <a:schemeClr val="bg1">
-              <a:lumMod val="85000"/>
-            </a:schemeClr>
-          </a:solidFill>
-          <a:ln>
-            <a:noFill/>
-          </a:ln>
-        </p:spPr>
-        <p:style>
-          <a:lnRef idx="2">
-            <a:schemeClr val="accent1">
-              <a:shade val="50000"/>
-            </a:schemeClr>
-          </a:lnRef>
-          <a:fillRef idx="1">
-            <a:schemeClr val="accent1"/>
-          </a:fillRef>
-          <a:effectRef idx="0">
-            <a:schemeClr val="accent1"/>
-          </a:effectRef>
-          <a:fontRef idx="minor">
-            <a:schemeClr val="lt1"/>
-          </a:fontRef>
-        </p:style>
-        <p:txBody>
-          <a:bodyPr rot="0" spcFirstLastPara="0" vertOverflow="overflow" horzOverflow="overflow" vert="horz" wrap="square" lIns="91440" tIns="45720" rIns="91440" bIns="45720" numCol="1" spcCol="0" rtlCol="0" fromWordArt="0" anchor="ctr" anchorCtr="0" forceAA="0" compatLnSpc="1">
-            <a:prstTxWarp prst="textNoShape">
-              <a:avLst/>
-            </a:prstTxWarp>
-            <a:noAutofit/>
-          </a:bodyPr>
-          <a:lstStyle/>
-          <a:p>
-            <a:pPr algn="ctr"/>
-            <a:r>
-              <a:rPr lang="en-US" sz="1800" b="1" dirty="0">
-                <a:solidFill>
-                  <a:schemeClr val="tx1"/>
-                </a:solidFill>
-                <a:latin typeface="Helvetica" pitchFamily="2" charset="0"/>
-                <a:ea typeface="Helvetica Neue Medium" panose="02000503000000020004" pitchFamily="2" charset="0"/>
-                <a:cs typeface="Helvetica Neue Medium" panose="02000503000000020004" pitchFamily="2" charset="0"/>
-              </a:rPr>
-              <a:t>Low interest in religion</a:t>
-            </a:r>
-          </a:p>
-        </p:txBody>
-      </p:sp>
-    </p:spTree>
-    <p:extLst>
-      <p:ext uri="{BB962C8B-B14F-4D97-AF65-F5344CB8AC3E}">
-        <p14:creationId xmlns:p14="http://schemas.microsoft.com/office/powerpoint/2010/main" val="2105454975"/>
-      </p:ext>
-    </p:extLst>
-  </p:cSld>
-  <p:clrMapOvr>
-    <a:masterClrMapping/>
-  </p:clrMapOvr>
-</p:sld>
-</file>
-
-<file path=ppt/slides/slide15.xml><?xml version="1.0" encoding="utf-8"?>
-<p:sld xmlns:a="http://schemas.openxmlformats.org/drawingml/2006/main" xmlns:r="http://schemas.openxmlformats.org/officeDocument/2006/relationships" xmlns:p="http://schemas.openxmlformats.org/presentationml/2006/main">
-  <p:cSld>
-    <p:bg>
-      <p:bgPr>
-        <a:solidFill>
-          <a:schemeClr val="bg1">
-            <a:alpha val="0"/>
-          </a:schemeClr>
-        </a:solidFill>
-        <a:effectLst/>
-      </p:bgPr>
-    </p:bg>
-    <p:spTree>
-      <p:nvGrpSpPr>
-        <p:cNvPr id="1" name=""/>
-        <p:cNvGrpSpPr/>
-        <p:nvPr/>
-      </p:nvGrpSpPr>
-      <p:grpSpPr>
-        <a:xfrm>
-          <a:off x="0" y="0"/>
-          <a:ext cx="0" cy="0"/>
-          <a:chOff x="0" y="0"/>
-          <a:chExt cx="0" cy="0"/>
-        </a:xfrm>
-      </p:grpSpPr>
-      <p:sp>
-        <p:nvSpPr>
-          <p:cNvPr id="4" name="Rounded Rectangle 3">
-            <a:extLst>
-              <a:ext uri="{FF2B5EF4-FFF2-40B4-BE49-F238E27FC236}">
-                <a16:creationId xmlns:a16="http://schemas.microsoft.com/office/drawing/2014/main" id="{4017A166-4188-F842-9BBD-BD585C819181}"/>
-              </a:ext>
-            </a:extLst>
-          </p:cNvPr>
-          <p:cNvSpPr/>
-          <p:nvPr/>
-        </p:nvSpPr>
-        <p:spPr>
-          <a:xfrm>
-            <a:off x="3459721" y="614234"/>
-            <a:ext cx="3206191" cy="374190"/>
-          </a:xfrm>
-          <a:prstGeom prst="roundRect">
-            <a:avLst/>
-          </a:prstGeom>
-          <a:solidFill>
-            <a:schemeClr val="bg1">
-              <a:lumMod val="85000"/>
-            </a:schemeClr>
-          </a:solidFill>
-          <a:ln>
-            <a:noFill/>
-          </a:ln>
-        </p:spPr>
-        <p:style>
-          <a:lnRef idx="2">
-            <a:schemeClr val="accent1">
-              <a:shade val="50000"/>
-            </a:schemeClr>
-          </a:lnRef>
-          <a:fillRef idx="1">
-            <a:schemeClr val="accent1"/>
-          </a:fillRef>
-          <a:effectRef idx="0">
-            <a:schemeClr val="accent1"/>
-          </a:effectRef>
-          <a:fontRef idx="minor">
-            <a:schemeClr val="lt1"/>
-          </a:fontRef>
-        </p:style>
-        <p:txBody>
-          <a:bodyPr rot="0" spcFirstLastPara="0" vertOverflow="overflow" horzOverflow="overflow" vert="horz" wrap="square" lIns="91440" tIns="45720" rIns="91440" bIns="45720" numCol="1" spcCol="0" rtlCol="0" fromWordArt="0" anchor="ctr" anchorCtr="0" forceAA="0" compatLnSpc="1">
-            <a:prstTxWarp prst="textNoShape">
-              <a:avLst/>
-            </a:prstTxWarp>
-            <a:noAutofit/>
-          </a:bodyPr>
-          <a:lstStyle/>
-          <a:p>
-            <a:pPr algn="ctr"/>
-            <a:r>
-              <a:rPr lang="en-US" sz="1800" b="1" dirty="0">
-                <a:solidFill>
-                  <a:schemeClr val="tx1"/>
-                </a:solidFill>
-                <a:latin typeface="Helvetica" pitchFamily="2" charset="0"/>
-                <a:ea typeface="Helvetica Neue Medium" panose="02000503000000020004" pitchFamily="2" charset="0"/>
-                <a:cs typeface="Helvetica Neue Medium" panose="02000503000000020004" pitchFamily="2" charset="0"/>
-              </a:rPr>
-              <a:t>Normal interest in religion</a:t>
-            </a:r>
-          </a:p>
-        </p:txBody>
-      </p:sp>
-    </p:spTree>
-    <p:extLst>
-      <p:ext uri="{BB962C8B-B14F-4D97-AF65-F5344CB8AC3E}">
-        <p14:creationId xmlns:p14="http://schemas.microsoft.com/office/powerpoint/2010/main" val="2659442250"/>
-      </p:ext>
-    </p:extLst>
-  </p:cSld>
-  <p:clrMapOvr>
-    <a:masterClrMapping/>
-  </p:clrMapOvr>
-</p:sld>
-</file>
-
-<file path=ppt/slides/slide16.xml><?xml version="1.0" encoding="utf-8"?>
-<p:sld xmlns:a="http://schemas.openxmlformats.org/drawingml/2006/main" xmlns:r="http://schemas.openxmlformats.org/officeDocument/2006/relationships" xmlns:p="http://schemas.openxmlformats.org/presentationml/2006/main">
-  <p:cSld>
-    <p:bg>
-      <p:bgPr>
-        <a:solidFill>
-          <a:schemeClr val="bg1">
-            <a:alpha val="0"/>
-          </a:schemeClr>
-        </a:solidFill>
-        <a:effectLst/>
-      </p:bgPr>
-    </p:bg>
-    <p:spTree>
-      <p:nvGrpSpPr>
-        <p:cNvPr id="1" name=""/>
-        <p:cNvGrpSpPr/>
-        <p:nvPr/>
-      </p:nvGrpSpPr>
-      <p:grpSpPr>
-        <a:xfrm>
-          <a:off x="0" y="0"/>
-          <a:ext cx="0" cy="0"/>
-          <a:chOff x="0" y="0"/>
-          <a:chExt cx="0" cy="0"/>
-        </a:xfrm>
-      </p:grpSpPr>
-      <p:sp>
-        <p:nvSpPr>
-          <p:cNvPr id="17" name="Rounded Rectangle 16">
-            <a:extLst>
-              <a:ext uri="{FF2B5EF4-FFF2-40B4-BE49-F238E27FC236}">
-                <a16:creationId xmlns:a16="http://schemas.microsoft.com/office/drawing/2014/main" id="{8E9AE9C6-EBE8-8F46-A7A2-D2E2E2C711E9}"/>
-              </a:ext>
-            </a:extLst>
-          </p:cNvPr>
-          <p:cNvSpPr/>
-          <p:nvPr/>
-        </p:nvSpPr>
-        <p:spPr>
-          <a:xfrm>
-            <a:off x="3459721" y="614234"/>
-            <a:ext cx="3206191" cy="374190"/>
-          </a:xfrm>
-          <a:prstGeom prst="roundRect">
-            <a:avLst/>
-          </a:prstGeom>
-          <a:solidFill>
-            <a:schemeClr val="bg1">
-              <a:lumMod val="85000"/>
-            </a:schemeClr>
-          </a:solidFill>
-          <a:ln>
-            <a:noFill/>
-          </a:ln>
-        </p:spPr>
-        <p:style>
-          <a:lnRef idx="2">
-            <a:schemeClr val="accent1">
-              <a:shade val="50000"/>
-            </a:schemeClr>
-          </a:lnRef>
-          <a:fillRef idx="1">
-            <a:schemeClr val="accent1"/>
-          </a:fillRef>
-          <a:effectRef idx="0">
-            <a:schemeClr val="accent1"/>
-          </a:effectRef>
-          <a:fontRef idx="minor">
-            <a:schemeClr val="lt1"/>
-          </a:fontRef>
-        </p:style>
-        <p:txBody>
-          <a:bodyPr rot="0" spcFirstLastPara="0" vertOverflow="overflow" horzOverflow="overflow" vert="horz" wrap="square" lIns="91440" tIns="45720" rIns="91440" bIns="45720" numCol="1" spcCol="0" rtlCol="0" fromWordArt="0" anchor="ctr" anchorCtr="0" forceAA="0" compatLnSpc="1">
-            <a:prstTxWarp prst="textNoShape">
-              <a:avLst/>
-            </a:prstTxWarp>
-            <a:noAutofit/>
-          </a:bodyPr>
-          <a:lstStyle/>
-          <a:p>
-            <a:pPr algn="ctr"/>
-            <a:r>
-              <a:rPr lang="en-US" sz="1800" b="1" dirty="0">
-                <a:solidFill>
-                  <a:schemeClr val="tx1"/>
-                </a:solidFill>
-                <a:latin typeface="Helvetica" pitchFamily="2" charset="0"/>
-                <a:ea typeface="Helvetica Neue Medium" panose="02000503000000020004" pitchFamily="2" charset="0"/>
-                <a:cs typeface="Helvetica Neue Medium" panose="02000503000000020004" pitchFamily="2" charset="0"/>
-              </a:rPr>
-              <a:t>???</a:t>
-            </a:r>
-          </a:p>
-        </p:txBody>
-      </p:sp>
-    </p:spTree>
-    <p:extLst>
-      <p:ext uri="{BB962C8B-B14F-4D97-AF65-F5344CB8AC3E}">
-        <p14:creationId xmlns:p14="http://schemas.microsoft.com/office/powerpoint/2010/main" val="2937526981"/>
-      </p:ext>
-    </p:extLst>
-  </p:cSld>
-  <p:clrMapOvr>
-    <a:masterClrMapping/>
-  </p:clrMapOvr>
-</p:sld>
-</file>
-
-<file path=ppt/slides/slide17.xml><?xml version="1.0" encoding="utf-8"?>
-<p:sld xmlns:a="http://schemas.openxmlformats.org/drawingml/2006/main" xmlns:r="http://schemas.openxmlformats.org/officeDocument/2006/relationships" xmlns:p="http://schemas.openxmlformats.org/presentationml/2006/main">
-  <p:cSld>
-    <p:bg>
-      <p:bgPr>
-        <a:solidFill>
-          <a:schemeClr val="bg1">
-            <a:alpha val="0"/>
-          </a:schemeClr>
-        </a:solidFill>
-        <a:effectLst/>
-      </p:bgPr>
-    </p:bg>
-    <p:spTree>
-      <p:nvGrpSpPr>
-        <p:cNvPr id="1" name=""/>
-        <p:cNvGrpSpPr/>
-        <p:nvPr/>
-      </p:nvGrpSpPr>
-      <p:grpSpPr>
-        <a:xfrm>
-          <a:off x="0" y="0"/>
-          <a:ext cx="0" cy="0"/>
-          <a:chOff x="0" y="0"/>
-          <a:chExt cx="0" cy="0"/>
-        </a:xfrm>
-      </p:grpSpPr>
-      <p:sp>
-        <p:nvSpPr>
-          <p:cNvPr id="17" name="Rounded Rectangle 16">
-            <a:extLst>
-              <a:ext uri="{FF2B5EF4-FFF2-40B4-BE49-F238E27FC236}">
-                <a16:creationId xmlns:a16="http://schemas.microsoft.com/office/drawing/2014/main" id="{8E9AE9C6-EBE8-8F46-A7A2-D2E2E2C711E9}"/>
-              </a:ext>
-            </a:extLst>
-          </p:cNvPr>
-          <p:cNvSpPr/>
-          <p:nvPr/>
-        </p:nvSpPr>
-        <p:spPr>
-          <a:xfrm>
-            <a:off x="3459721" y="614234"/>
-            <a:ext cx="3206191" cy="374190"/>
-          </a:xfrm>
-          <a:prstGeom prst="roundRect">
-            <a:avLst/>
-          </a:prstGeom>
-          <a:solidFill>
-            <a:schemeClr val="bg1">
-              <a:lumMod val="85000"/>
-            </a:schemeClr>
-          </a:solidFill>
-          <a:ln>
-            <a:noFill/>
-          </a:ln>
-        </p:spPr>
-        <p:style>
-          <a:lnRef idx="2">
-            <a:schemeClr val="accent1">
-              <a:shade val="50000"/>
-            </a:schemeClr>
-          </a:lnRef>
-          <a:fillRef idx="1">
-            <a:schemeClr val="accent1"/>
-          </a:fillRef>
-          <a:effectRef idx="0">
-            <a:schemeClr val="accent1"/>
-          </a:effectRef>
-          <a:fontRef idx="minor">
-            <a:schemeClr val="lt1"/>
-          </a:fontRef>
-        </p:style>
-        <p:txBody>
-          <a:bodyPr rot="0" spcFirstLastPara="0" vertOverflow="overflow" horzOverflow="overflow" vert="horz" wrap="square" lIns="91440" tIns="45720" rIns="91440" bIns="45720" numCol="1" spcCol="0" rtlCol="0" fromWordArt="0" anchor="ctr" anchorCtr="0" forceAA="0" compatLnSpc="1">
-            <a:prstTxWarp prst="textNoShape">
-              <a:avLst/>
-            </a:prstTxWarp>
-            <a:noAutofit/>
-          </a:bodyPr>
-          <a:lstStyle/>
-          <a:p>
-            <a:pPr algn="ctr"/>
-            <a:r>
-              <a:rPr lang="en-US" sz="1800" b="1" dirty="0">
-                <a:solidFill>
-                  <a:schemeClr val="tx1"/>
-                </a:solidFill>
-                <a:latin typeface="Helvetica" pitchFamily="2" charset="0"/>
-                <a:ea typeface="Helvetica Neue Medium" panose="02000503000000020004" pitchFamily="2" charset="0"/>
-                <a:cs typeface="Helvetica Neue Medium" panose="02000503000000020004" pitchFamily="2" charset="0"/>
-              </a:rPr>
-              <a:t>_____</a:t>
-            </a:r>
-          </a:p>
-        </p:txBody>
-      </p:sp>
-    </p:spTree>
-    <p:extLst>
-      <p:ext uri="{BB962C8B-B14F-4D97-AF65-F5344CB8AC3E}">
-        <p14:creationId xmlns:p14="http://schemas.microsoft.com/office/powerpoint/2010/main" val="117620960"/>
       </p:ext>
     </p:extLst>
   </p:cSld>
@@ -4387,593 +3506,6 @@
 </file>
 
 <file path=ppt/slides/slide3.xml><?xml version="1.0" encoding="utf-8"?>
-<p:sld xmlns:a="http://schemas.openxmlformats.org/drawingml/2006/main" xmlns:r="http://schemas.openxmlformats.org/officeDocument/2006/relationships" xmlns:p="http://schemas.openxmlformats.org/presentationml/2006/main" showMasterSp="0">
-  <p:cSld>
-    <p:bg>
-      <p:bgPr>
-        <a:solidFill>
-          <a:schemeClr val="bg1">
-            <a:alpha val="0"/>
-          </a:schemeClr>
-        </a:solidFill>
-        <a:effectLst/>
-      </p:bgPr>
-    </p:bg>
-    <p:spTree>
-      <p:nvGrpSpPr>
-        <p:cNvPr id="1" name=""/>
-        <p:cNvGrpSpPr/>
-        <p:nvPr/>
-      </p:nvGrpSpPr>
-      <p:grpSpPr>
-        <a:xfrm>
-          <a:off x="0" y="0"/>
-          <a:ext cx="0" cy="0"/>
-          <a:chOff x="0" y="0"/>
-          <a:chExt cx="0" cy="0"/>
-        </a:xfrm>
-      </p:grpSpPr>
-      <p:sp>
-        <p:nvSpPr>
-          <p:cNvPr id="4" name="Rounded Rectangle 3">
-            <a:extLst>
-              <a:ext uri="{FF2B5EF4-FFF2-40B4-BE49-F238E27FC236}">
-                <a16:creationId xmlns:a16="http://schemas.microsoft.com/office/drawing/2014/main" id="{B095B429-1D62-654D-AE3F-4C5BFDE17C67}"/>
-              </a:ext>
-            </a:extLst>
-          </p:cNvPr>
-          <p:cNvSpPr/>
-          <p:nvPr/>
-        </p:nvSpPr>
-        <p:spPr>
-          <a:xfrm>
-            <a:off x="-1924" y="248513"/>
-            <a:ext cx="2560932" cy="490398"/>
-          </a:xfrm>
-          <a:prstGeom prst="roundRect">
-            <a:avLst/>
-          </a:prstGeom>
-          <a:solidFill>
-            <a:schemeClr val="bg1">
-              <a:lumMod val="85000"/>
-            </a:schemeClr>
-          </a:solidFill>
-          <a:ln>
-            <a:noFill/>
-          </a:ln>
-        </p:spPr>
-        <p:style>
-          <a:lnRef idx="2">
-            <a:schemeClr val="accent1">
-              <a:shade val="50000"/>
-            </a:schemeClr>
-          </a:lnRef>
-          <a:fillRef idx="1">
-            <a:schemeClr val="accent1"/>
-          </a:fillRef>
-          <a:effectRef idx="0">
-            <a:schemeClr val="accent1"/>
-          </a:effectRef>
-          <a:fontRef idx="minor">
-            <a:schemeClr val="lt1"/>
-          </a:fontRef>
-        </p:style>
-        <p:txBody>
-          <a:bodyPr rot="0" spcFirstLastPara="0" vertOverflow="overflow" horzOverflow="overflow" vert="horz" wrap="square" lIns="91440" tIns="45720" rIns="91440" bIns="45720" numCol="1" spcCol="0" rtlCol="0" fromWordArt="0" anchor="ctr" anchorCtr="0" forceAA="0" compatLnSpc="1">
-            <a:prstTxWarp prst="textNoShape">
-              <a:avLst/>
-            </a:prstTxWarp>
-            <a:noAutofit/>
-          </a:bodyPr>
-          <a:lstStyle/>
-          <a:p>
-            <a:pPr algn="ctr"/>
-            <a:r>
-              <a:rPr lang="en-US" sz="1400" b="1" dirty="0">
-                <a:solidFill>
-                  <a:schemeClr val="tx1"/>
-                </a:solidFill>
-                <a:latin typeface="Helvetica" pitchFamily="2" charset="0"/>
-                <a:ea typeface="Helvetica Neue Medium" panose="02000503000000020004" pitchFamily="2" charset="0"/>
-                <a:cs typeface="Helvetica Neue Medium" panose="02000503000000020004" pitchFamily="2" charset="0"/>
-              </a:rPr>
-              <a:t>High socio-economic </a:t>
-            </a:r>
-          </a:p>
-          <a:p>
-            <a:pPr algn="ctr"/>
-            <a:r>
-              <a:rPr lang="en-US" sz="1400" b="1" dirty="0">
-                <a:solidFill>
-                  <a:schemeClr val="tx1"/>
-                </a:solidFill>
-                <a:latin typeface="Helvetica" pitchFamily="2" charset="0"/>
-                <a:ea typeface="Helvetica Neue Medium" panose="02000503000000020004" pitchFamily="2" charset="0"/>
-                <a:cs typeface="Helvetica Neue Medium" panose="02000503000000020004" pitchFamily="2" charset="0"/>
-              </a:rPr>
-              <a:t>mobility</a:t>
-            </a:r>
-          </a:p>
-        </p:txBody>
-      </p:sp>
-    </p:spTree>
-    <p:extLst>
-      <p:ext uri="{BB962C8B-B14F-4D97-AF65-F5344CB8AC3E}">
-        <p14:creationId xmlns:p14="http://schemas.microsoft.com/office/powerpoint/2010/main" val="3274314287"/>
-      </p:ext>
-    </p:extLst>
-  </p:cSld>
-  <p:clrMapOvr>
-    <a:masterClrMapping/>
-  </p:clrMapOvr>
-</p:sld>
-</file>
-
-<file path=ppt/slides/slide4.xml><?xml version="1.0" encoding="utf-8"?>
-<p:sld xmlns:a="http://schemas.openxmlformats.org/drawingml/2006/main" xmlns:r="http://schemas.openxmlformats.org/officeDocument/2006/relationships" xmlns:p="http://schemas.openxmlformats.org/presentationml/2006/main" showMasterSp="0">
-  <p:cSld>
-    <p:bg>
-      <p:bgPr>
-        <a:solidFill>
-          <a:schemeClr val="bg1">
-            <a:alpha val="0"/>
-          </a:schemeClr>
-        </a:solidFill>
-        <a:effectLst/>
-      </p:bgPr>
-    </p:bg>
-    <p:spTree>
-      <p:nvGrpSpPr>
-        <p:cNvPr id="1" name=""/>
-        <p:cNvGrpSpPr/>
-        <p:nvPr/>
-      </p:nvGrpSpPr>
-      <p:grpSpPr>
-        <a:xfrm>
-          <a:off x="0" y="0"/>
-          <a:ext cx="0" cy="0"/>
-          <a:chOff x="0" y="0"/>
-          <a:chExt cx="0" cy="0"/>
-        </a:xfrm>
-      </p:grpSpPr>
-      <p:sp>
-        <p:nvSpPr>
-          <p:cNvPr id="4" name="Rounded Rectangle 3">
-            <a:extLst>
-              <a:ext uri="{FF2B5EF4-FFF2-40B4-BE49-F238E27FC236}">
-                <a16:creationId xmlns:a16="http://schemas.microsoft.com/office/drawing/2014/main" id="{B095B429-1D62-654D-AE3F-4C5BFDE17C67}"/>
-              </a:ext>
-            </a:extLst>
-          </p:cNvPr>
-          <p:cNvSpPr/>
-          <p:nvPr/>
-        </p:nvSpPr>
-        <p:spPr>
-          <a:xfrm>
-            <a:off x="-1924" y="248513"/>
-            <a:ext cx="2560932" cy="490398"/>
-          </a:xfrm>
-          <a:prstGeom prst="roundRect">
-            <a:avLst/>
-          </a:prstGeom>
-          <a:solidFill>
-            <a:schemeClr val="bg1">
-              <a:lumMod val="85000"/>
-            </a:schemeClr>
-          </a:solidFill>
-          <a:ln>
-            <a:noFill/>
-          </a:ln>
-        </p:spPr>
-        <p:style>
-          <a:lnRef idx="2">
-            <a:schemeClr val="accent1">
-              <a:shade val="50000"/>
-            </a:schemeClr>
-          </a:lnRef>
-          <a:fillRef idx="1">
-            <a:schemeClr val="accent1"/>
-          </a:fillRef>
-          <a:effectRef idx="0">
-            <a:schemeClr val="accent1"/>
-          </a:effectRef>
-          <a:fontRef idx="minor">
-            <a:schemeClr val="lt1"/>
-          </a:fontRef>
-        </p:style>
-        <p:txBody>
-          <a:bodyPr rot="0" spcFirstLastPara="0" vertOverflow="overflow" horzOverflow="overflow" vert="horz" wrap="square" lIns="91440" tIns="45720" rIns="91440" bIns="45720" numCol="1" spcCol="0" rtlCol="0" fromWordArt="0" anchor="ctr" anchorCtr="0" forceAA="0" compatLnSpc="1">
-            <a:prstTxWarp prst="textNoShape">
-              <a:avLst/>
-            </a:prstTxWarp>
-            <a:noAutofit/>
-          </a:bodyPr>
-          <a:lstStyle/>
-          <a:p>
-            <a:pPr algn="ctr"/>
-            <a:r>
-              <a:rPr lang="en-US" sz="1400" b="1" dirty="0">
-                <a:solidFill>
-                  <a:schemeClr val="tx1"/>
-                </a:solidFill>
-                <a:latin typeface="Helvetica" pitchFamily="2" charset="0"/>
-                <a:ea typeface="Helvetica Neue Medium" panose="02000503000000020004" pitchFamily="2" charset="0"/>
-                <a:cs typeface="Helvetica Neue Medium" panose="02000503000000020004" pitchFamily="2" charset="0"/>
-              </a:rPr>
-              <a:t>Low socio-economic </a:t>
-            </a:r>
-          </a:p>
-          <a:p>
-            <a:pPr algn="ctr"/>
-            <a:r>
-              <a:rPr lang="en-US" sz="1400" b="1" dirty="0">
-                <a:solidFill>
-                  <a:schemeClr val="tx1"/>
-                </a:solidFill>
-                <a:latin typeface="Helvetica" pitchFamily="2" charset="0"/>
-                <a:ea typeface="Helvetica Neue Medium" panose="02000503000000020004" pitchFamily="2" charset="0"/>
-                <a:cs typeface="Helvetica Neue Medium" panose="02000503000000020004" pitchFamily="2" charset="0"/>
-              </a:rPr>
-              <a:t>mobility</a:t>
-            </a:r>
-          </a:p>
-        </p:txBody>
-      </p:sp>
-    </p:spTree>
-    <p:extLst>
-      <p:ext uri="{BB962C8B-B14F-4D97-AF65-F5344CB8AC3E}">
-        <p14:creationId xmlns:p14="http://schemas.microsoft.com/office/powerpoint/2010/main" val="4250005395"/>
-      </p:ext>
-    </p:extLst>
-  </p:cSld>
-  <p:clrMapOvr>
-    <a:masterClrMapping/>
-  </p:clrMapOvr>
-</p:sld>
-</file>
-
-<file path=ppt/slides/slide5.xml><?xml version="1.0" encoding="utf-8"?>
-<p:sld xmlns:a="http://schemas.openxmlformats.org/drawingml/2006/main" xmlns:r="http://schemas.openxmlformats.org/officeDocument/2006/relationships" xmlns:p="http://schemas.openxmlformats.org/presentationml/2006/main" showMasterSp="0">
-  <p:cSld>
-    <p:bg>
-      <p:bgPr>
-        <a:solidFill>
-          <a:schemeClr val="bg1">
-            <a:alpha val="0"/>
-          </a:schemeClr>
-        </a:solidFill>
-        <a:effectLst/>
-      </p:bgPr>
-    </p:bg>
-    <p:spTree>
-      <p:nvGrpSpPr>
-        <p:cNvPr id="1" name=""/>
-        <p:cNvGrpSpPr/>
-        <p:nvPr/>
-      </p:nvGrpSpPr>
-      <p:grpSpPr>
-        <a:xfrm>
-          <a:off x="0" y="0"/>
-          <a:ext cx="0" cy="0"/>
-          <a:chOff x="0" y="0"/>
-          <a:chExt cx="0" cy="0"/>
-        </a:xfrm>
-      </p:grpSpPr>
-      <p:sp>
-        <p:nvSpPr>
-          <p:cNvPr id="4" name="Rounded Rectangle 3">
-            <a:extLst>
-              <a:ext uri="{FF2B5EF4-FFF2-40B4-BE49-F238E27FC236}">
-                <a16:creationId xmlns:a16="http://schemas.microsoft.com/office/drawing/2014/main" id="{B095B429-1D62-654D-AE3F-4C5BFDE17C67}"/>
-              </a:ext>
-            </a:extLst>
-          </p:cNvPr>
-          <p:cNvSpPr/>
-          <p:nvPr/>
-        </p:nvSpPr>
-        <p:spPr>
-          <a:xfrm>
-            <a:off x="-1924" y="248513"/>
-            <a:ext cx="2560932" cy="490398"/>
-          </a:xfrm>
-          <a:prstGeom prst="roundRect">
-            <a:avLst/>
-          </a:prstGeom>
-          <a:solidFill>
-            <a:schemeClr val="bg1">
-              <a:lumMod val="85000"/>
-            </a:schemeClr>
-          </a:solidFill>
-          <a:ln>
-            <a:noFill/>
-          </a:ln>
-        </p:spPr>
-        <p:style>
-          <a:lnRef idx="2">
-            <a:schemeClr val="accent1">
-              <a:shade val="50000"/>
-            </a:schemeClr>
-          </a:lnRef>
-          <a:fillRef idx="1">
-            <a:schemeClr val="accent1"/>
-          </a:fillRef>
-          <a:effectRef idx="0">
-            <a:schemeClr val="accent1"/>
-          </a:effectRef>
-          <a:fontRef idx="minor">
-            <a:schemeClr val="lt1"/>
-          </a:fontRef>
-        </p:style>
-        <p:txBody>
-          <a:bodyPr rot="0" spcFirstLastPara="0" vertOverflow="overflow" horzOverflow="overflow" vert="horz" wrap="square" lIns="91440" tIns="45720" rIns="91440" bIns="45720" numCol="1" spcCol="0" rtlCol="0" fromWordArt="0" anchor="ctr" anchorCtr="0" forceAA="0" compatLnSpc="1">
-            <a:prstTxWarp prst="textNoShape">
-              <a:avLst/>
-            </a:prstTxWarp>
-            <a:noAutofit/>
-          </a:bodyPr>
-          <a:lstStyle/>
-          <a:p>
-            <a:pPr algn="ctr"/>
-            <a:r>
-              <a:rPr lang="en-US" sz="1400" b="1" dirty="0">
-                <a:solidFill>
-                  <a:schemeClr val="tx1"/>
-                </a:solidFill>
-                <a:latin typeface="Helvetica" pitchFamily="2" charset="0"/>
-                <a:ea typeface="Helvetica Neue Medium" panose="02000503000000020004" pitchFamily="2" charset="0"/>
-                <a:cs typeface="Helvetica Neue Medium" panose="02000503000000020004" pitchFamily="2" charset="0"/>
-              </a:rPr>
-              <a:t>Normal socio-economic </a:t>
-            </a:r>
-          </a:p>
-          <a:p>
-            <a:pPr algn="ctr"/>
-            <a:r>
-              <a:rPr lang="en-US" sz="1400" b="1" dirty="0">
-                <a:solidFill>
-                  <a:schemeClr val="tx1"/>
-                </a:solidFill>
-                <a:latin typeface="Helvetica" pitchFamily="2" charset="0"/>
-                <a:ea typeface="Helvetica Neue Medium" panose="02000503000000020004" pitchFamily="2" charset="0"/>
-                <a:cs typeface="Helvetica Neue Medium" panose="02000503000000020004" pitchFamily="2" charset="0"/>
-              </a:rPr>
-              <a:t>mobility</a:t>
-            </a:r>
-          </a:p>
-        </p:txBody>
-      </p:sp>
-    </p:spTree>
-    <p:extLst>
-      <p:ext uri="{BB962C8B-B14F-4D97-AF65-F5344CB8AC3E}">
-        <p14:creationId xmlns:p14="http://schemas.microsoft.com/office/powerpoint/2010/main" val="3956910146"/>
-      </p:ext>
-    </p:extLst>
-  </p:cSld>
-  <p:clrMapOvr>
-    <a:masterClrMapping/>
-  </p:clrMapOvr>
-</p:sld>
-</file>
-
-<file path=ppt/slides/slide6.xml><?xml version="1.0" encoding="utf-8"?>
-<p:sld xmlns:a="http://schemas.openxmlformats.org/drawingml/2006/main" xmlns:r="http://schemas.openxmlformats.org/officeDocument/2006/relationships" xmlns:p="http://schemas.openxmlformats.org/presentationml/2006/main" showMasterSp="0">
-  <p:cSld>
-    <p:bg>
-      <p:bgPr>
-        <a:solidFill>
-          <a:schemeClr val="bg1">
-            <a:alpha val="0"/>
-          </a:schemeClr>
-        </a:solidFill>
-        <a:effectLst/>
-      </p:bgPr>
-    </p:bg>
-    <p:spTree>
-      <p:nvGrpSpPr>
-        <p:cNvPr id="1" name=""/>
-        <p:cNvGrpSpPr/>
-        <p:nvPr/>
-      </p:nvGrpSpPr>
-      <p:grpSpPr>
-        <a:xfrm>
-          <a:off x="0" y="0"/>
-          <a:ext cx="0" cy="0"/>
-          <a:chOff x="0" y="0"/>
-          <a:chExt cx="0" cy="0"/>
-        </a:xfrm>
-      </p:grpSpPr>
-      <p:sp>
-        <p:nvSpPr>
-          <p:cNvPr id="3" name="Rounded Rectangle 2">
-            <a:extLst>
-              <a:ext uri="{FF2B5EF4-FFF2-40B4-BE49-F238E27FC236}">
-                <a16:creationId xmlns:a16="http://schemas.microsoft.com/office/drawing/2014/main" id="{1E8EC3DA-5FE8-864D-9829-24E0F833136D}"/>
-              </a:ext>
-            </a:extLst>
-          </p:cNvPr>
-          <p:cNvSpPr/>
-          <p:nvPr/>
-        </p:nvSpPr>
-        <p:spPr>
-          <a:xfrm>
-            <a:off x="-1924" y="248513"/>
-            <a:ext cx="2560932" cy="490398"/>
-          </a:xfrm>
-          <a:prstGeom prst="roundRect">
-            <a:avLst/>
-          </a:prstGeom>
-          <a:solidFill>
-            <a:schemeClr val="bg1">
-              <a:lumMod val="85000"/>
-            </a:schemeClr>
-          </a:solidFill>
-          <a:ln>
-            <a:noFill/>
-          </a:ln>
-        </p:spPr>
-        <p:style>
-          <a:lnRef idx="2">
-            <a:schemeClr val="accent1">
-              <a:shade val="50000"/>
-            </a:schemeClr>
-          </a:lnRef>
-          <a:fillRef idx="1">
-            <a:schemeClr val="accent1"/>
-          </a:fillRef>
-          <a:effectRef idx="0">
-            <a:schemeClr val="accent1"/>
-          </a:effectRef>
-          <a:fontRef idx="minor">
-            <a:schemeClr val="lt1"/>
-          </a:fontRef>
-        </p:style>
-        <p:txBody>
-          <a:bodyPr rot="0" spcFirstLastPara="0" vertOverflow="overflow" horzOverflow="overflow" vert="horz" wrap="square" lIns="91440" tIns="45720" rIns="91440" bIns="45720" numCol="1" spcCol="0" rtlCol="0" fromWordArt="0" anchor="ctr" anchorCtr="0" forceAA="0" compatLnSpc="1">
-            <a:prstTxWarp prst="textNoShape">
-              <a:avLst/>
-            </a:prstTxWarp>
-            <a:noAutofit/>
-          </a:bodyPr>
-          <a:lstStyle/>
-          <a:p>
-            <a:pPr algn="ctr"/>
-            <a:r>
-              <a:rPr lang="en-US" sz="1800" b="1" dirty="0">
-                <a:solidFill>
-                  <a:schemeClr val="tx1"/>
-                </a:solidFill>
-                <a:latin typeface="Helvetica" pitchFamily="2" charset="0"/>
-                <a:ea typeface="Helvetica Neue Medium" panose="02000503000000020004" pitchFamily="2" charset="0"/>
-                <a:cs typeface="Helvetica Neue Medium" panose="02000503000000020004" pitchFamily="2" charset="0"/>
-              </a:rPr>
-              <a:t>???</a:t>
-            </a:r>
-          </a:p>
-        </p:txBody>
-      </p:sp>
-    </p:spTree>
-    <p:extLst>
-      <p:ext uri="{BB962C8B-B14F-4D97-AF65-F5344CB8AC3E}">
-        <p14:creationId xmlns:p14="http://schemas.microsoft.com/office/powerpoint/2010/main" val="961509969"/>
-      </p:ext>
-    </p:extLst>
-  </p:cSld>
-  <p:clrMapOvr>
-    <a:masterClrMapping/>
-  </p:clrMapOvr>
-</p:sld>
-</file>
-
-<file path=ppt/slides/slide7.xml><?xml version="1.0" encoding="utf-8"?>
-<p:sld xmlns:a="http://schemas.openxmlformats.org/drawingml/2006/main" xmlns:r="http://schemas.openxmlformats.org/officeDocument/2006/relationships" xmlns:p="http://schemas.openxmlformats.org/presentationml/2006/main" showMasterSp="0">
-  <p:cSld>
-    <p:bg>
-      <p:bgPr>
-        <a:solidFill>
-          <a:schemeClr val="bg1">
-            <a:alpha val="0"/>
-          </a:schemeClr>
-        </a:solidFill>
-        <a:effectLst/>
-      </p:bgPr>
-    </p:bg>
-    <p:spTree>
-      <p:nvGrpSpPr>
-        <p:cNvPr id="1" name=""/>
-        <p:cNvGrpSpPr/>
-        <p:nvPr/>
-      </p:nvGrpSpPr>
-      <p:grpSpPr>
-        <a:xfrm>
-          <a:off x="0" y="0"/>
-          <a:ext cx="0" cy="0"/>
-          <a:chOff x="0" y="0"/>
-          <a:chExt cx="0" cy="0"/>
-        </a:xfrm>
-      </p:grpSpPr>
-      <p:sp>
-        <p:nvSpPr>
-          <p:cNvPr id="3" name="Rounded Rectangle 2">
-            <a:extLst>
-              <a:ext uri="{FF2B5EF4-FFF2-40B4-BE49-F238E27FC236}">
-                <a16:creationId xmlns:a16="http://schemas.microsoft.com/office/drawing/2014/main" id="{1E8EC3DA-5FE8-864D-9829-24E0F833136D}"/>
-              </a:ext>
-            </a:extLst>
-          </p:cNvPr>
-          <p:cNvSpPr/>
-          <p:nvPr/>
-        </p:nvSpPr>
-        <p:spPr>
-          <a:xfrm>
-            <a:off x="-1924" y="248513"/>
-            <a:ext cx="2560932" cy="490398"/>
-          </a:xfrm>
-          <a:prstGeom prst="roundRect">
-            <a:avLst/>
-          </a:prstGeom>
-          <a:solidFill>
-            <a:schemeClr val="bg1">
-              <a:lumMod val="85000"/>
-            </a:schemeClr>
-          </a:solidFill>
-          <a:ln>
-            <a:noFill/>
-          </a:ln>
-        </p:spPr>
-        <p:style>
-          <a:lnRef idx="2">
-            <a:schemeClr val="accent1">
-              <a:shade val="50000"/>
-            </a:schemeClr>
-          </a:lnRef>
-          <a:fillRef idx="1">
-            <a:schemeClr val="accent1"/>
-          </a:fillRef>
-          <a:effectRef idx="0">
-            <a:schemeClr val="accent1"/>
-          </a:effectRef>
-          <a:fontRef idx="minor">
-            <a:schemeClr val="lt1"/>
-          </a:fontRef>
-        </p:style>
-        <p:txBody>
-          <a:bodyPr rot="0" spcFirstLastPara="0" vertOverflow="overflow" horzOverflow="overflow" vert="horz" wrap="square" lIns="91440" tIns="45720" rIns="91440" bIns="45720" numCol="1" spcCol="0" rtlCol="0" fromWordArt="0" anchor="ctr" anchorCtr="0" forceAA="0" compatLnSpc="1">
-            <a:prstTxWarp prst="textNoShape">
-              <a:avLst/>
-            </a:prstTxWarp>
-            <a:noAutofit/>
-          </a:bodyPr>
-          <a:lstStyle/>
-          <a:p>
-            <a:pPr algn="ctr"/>
-            <a:r>
-              <a:rPr lang="en-US" sz="1800" b="1" dirty="0">
-                <a:solidFill>
-                  <a:schemeClr val="tx1"/>
-                </a:solidFill>
-                <a:latin typeface="Helvetica" pitchFamily="2" charset="0"/>
-                <a:ea typeface="Helvetica Neue Medium" panose="02000503000000020004" pitchFamily="2" charset="0"/>
-                <a:cs typeface="Helvetica Neue Medium" panose="02000503000000020004" pitchFamily="2" charset="0"/>
-              </a:rPr>
-              <a:t>_____</a:t>
-            </a:r>
-          </a:p>
-        </p:txBody>
-      </p:sp>
-    </p:spTree>
-    <p:extLst>
-      <p:ext uri="{BB962C8B-B14F-4D97-AF65-F5344CB8AC3E}">
-        <p14:creationId xmlns:p14="http://schemas.microsoft.com/office/powerpoint/2010/main" val="304740211"/>
-      </p:ext>
-    </p:extLst>
-  </p:cSld>
-  <p:clrMapOvr>
-    <a:masterClrMapping/>
-  </p:clrMapOvr>
-</p:sld>
-</file>
-
-<file path=ppt/slides/slide8.xml><?xml version="1.0" encoding="utf-8"?>
 <p:sld xmlns:a="http://schemas.openxmlformats.org/drawingml/2006/main" xmlns:r="http://schemas.openxmlformats.org/officeDocument/2006/relationships" xmlns:p="http://schemas.openxmlformats.org/presentationml/2006/main">
   <p:cSld>
     <p:spTree>
@@ -4992,10 +3524,10 @@
       </p:grpSpPr>
       <p:sp>
         <p:nvSpPr>
-          <p:cNvPr id="4" name="Rounded Rectangle 3">
+          <p:cNvPr id="3" name="Rounded Rectangle 2">
             <a:extLst>
               <a:ext uri="{FF2B5EF4-FFF2-40B4-BE49-F238E27FC236}">
-                <a16:creationId xmlns:a16="http://schemas.microsoft.com/office/drawing/2014/main" id="{53429979-B7B1-6A4F-8FBF-1395B30A54CD}"/>
+                <a16:creationId xmlns:a16="http://schemas.microsoft.com/office/drawing/2014/main" id="{FCE3DE20-67CE-5E48-A379-55B574B38D6B}"/>
               </a:ext>
             </a:extLst>
           </p:cNvPr>
@@ -5004,7 +3536,7 @@
         </p:nvSpPr>
         <p:spPr>
           <a:xfrm>
-            <a:off x="3459722" y="0"/>
+            <a:off x="3459722" y="163227"/>
             <a:ext cx="3206191" cy="374190"/>
           </a:xfrm>
           <a:prstGeom prst="roundRect">
@@ -5046,7 +3578,7 @@
           <a:p>
             <a:pPr algn="ctr"/>
             <a:r>
-              <a:rPr lang="en-US" sz="1600" b="1" dirty="0">
+              <a:rPr lang="en-US" sz="1800" b="1" dirty="0">
                 <a:solidFill>
                   <a:schemeClr val="tx1"/>
                 </a:solidFill>
@@ -5054,47 +3586,17 @@
                 <a:ea typeface="Helvetica Neue Medium" panose="02000503000000020004" pitchFamily="2" charset="0"/>
                 <a:cs typeface="Helvetica Neue Medium" panose="02000503000000020004" pitchFamily="2" charset="0"/>
               </a:rPr>
-              <a:t>High degree of urbanization</a:t>
-            </a:r>
-          </a:p>
-        </p:txBody>
-      </p:sp>
-    </p:spTree>
-    <p:extLst>
-      <p:ext uri="{BB962C8B-B14F-4D97-AF65-F5344CB8AC3E}">
-        <p14:creationId xmlns:p14="http://schemas.microsoft.com/office/powerpoint/2010/main" val="862577098"/>
-      </p:ext>
-    </p:extLst>
-  </p:cSld>
-  <p:clrMapOvr>
-    <a:masterClrMapping/>
-  </p:clrMapOvr>
-</p:sld>
-</file>
-
-<file path=ppt/slides/slide9.xml><?xml version="1.0" encoding="utf-8"?>
-<p:sld xmlns:a="http://schemas.openxmlformats.org/drawingml/2006/main" xmlns:r="http://schemas.openxmlformats.org/officeDocument/2006/relationships" xmlns:p="http://schemas.openxmlformats.org/presentationml/2006/main">
-  <p:cSld>
-    <p:spTree>
-      <p:nvGrpSpPr>
-        <p:cNvPr id="1" name=""/>
-        <p:cNvGrpSpPr/>
-        <p:nvPr/>
-      </p:nvGrpSpPr>
-      <p:grpSpPr>
-        <a:xfrm>
-          <a:off x="0" y="0"/>
-          <a:ext cx="0" cy="0"/>
-          <a:chOff x="0" y="0"/>
-          <a:chExt cx="0" cy="0"/>
-        </a:xfrm>
-      </p:grpSpPr>
-      <p:sp>
-        <p:nvSpPr>
-          <p:cNvPr id="4" name="Rounded Rectangle 3">
+              <a:t>Normal interest in religion</a:t>
+            </a:r>
+          </a:p>
+        </p:txBody>
+      </p:sp>
+      <p:sp>
+        <p:nvSpPr>
+          <p:cNvPr id="4" name="Rounded Rectangle 2">
             <a:extLst>
               <a:ext uri="{FF2B5EF4-FFF2-40B4-BE49-F238E27FC236}">
-                <a16:creationId xmlns:a16="http://schemas.microsoft.com/office/drawing/2014/main" id="{53429979-B7B1-6A4F-8FBF-1395B30A54CD}"/>
+                <a16:creationId xmlns:a16="http://schemas.microsoft.com/office/drawing/2014/main" id="{D5FE8990-4FC3-4735-9A3F-6B7FCF0EDB80}"/>
               </a:ext>
             </a:extLst>
           </p:cNvPr>
@@ -5103,7 +3605,7 @@
         </p:nvSpPr>
         <p:spPr>
           <a:xfrm>
-            <a:off x="3459722" y="0"/>
+            <a:off x="126765" y="163227"/>
             <a:ext cx="3206191" cy="374190"/>
           </a:xfrm>
           <a:prstGeom prst="roundRect">
@@ -5145,7 +3647,7 @@
           <a:p>
             <a:pPr algn="ctr"/>
             <a:r>
-              <a:rPr lang="en-US" sz="1600" b="1" dirty="0">
+              <a:rPr lang="en-US" sz="1800" b="1" dirty="0">
                 <a:solidFill>
                   <a:schemeClr val="tx1"/>
                 </a:solidFill>
@@ -5153,7 +3655,7 @@
                 <a:ea typeface="Helvetica Neue Medium" panose="02000503000000020004" pitchFamily="2" charset="0"/>
                 <a:cs typeface="Helvetica Neue Medium" panose="02000503000000020004" pitchFamily="2" charset="0"/>
               </a:rPr>
-              <a:t>Low degree of urbanization</a:t>
+              <a:t>____</a:t>
             </a:r>
           </a:p>
         </p:txBody>
@@ -5161,7 +3663,7 @@
     </p:spTree>
     <p:extLst>
       <p:ext uri="{BB962C8B-B14F-4D97-AF65-F5344CB8AC3E}">
-        <p14:creationId xmlns:p14="http://schemas.microsoft.com/office/powerpoint/2010/main" val="1599139649"/>
+        <p14:creationId xmlns:p14="http://schemas.microsoft.com/office/powerpoint/2010/main" val="2430264813"/>
       </p:ext>
     </p:extLst>
   </p:cSld>

</xml_diff>